<commit_message>
Random Equation Generate, Display(with single number), Other Images to two cameras. Shooting Bollets & Collision Control & Item Control Left
</commit_message>
<xml_diff>
--- a/Equation/Pictures.pptx
+++ b/Equation/Pictures.pptx
@@ -250,7 +250,7 @@
           <a:p>
             <a:fld id="{F00B919D-B4A1-482F-AA08-41F71413DB50}" type="datetimeFigureOut">
               <a:rPr lang="ko-KR" altLang="en-US" smtClean="0"/>
-              <a:t>2018-11-08</a:t>
+              <a:t>2018-11-09</a:t>
             </a:fld>
             <a:endParaRPr lang="ko-KR" altLang="en-US"/>
           </a:p>
@@ -420,7 +420,7 @@
           <a:p>
             <a:fld id="{F00B919D-B4A1-482F-AA08-41F71413DB50}" type="datetimeFigureOut">
               <a:rPr lang="ko-KR" altLang="en-US" smtClean="0"/>
-              <a:t>2018-11-08</a:t>
+              <a:t>2018-11-09</a:t>
             </a:fld>
             <a:endParaRPr lang="ko-KR" altLang="en-US"/>
           </a:p>
@@ -600,7 +600,7 @@
           <a:p>
             <a:fld id="{F00B919D-B4A1-482F-AA08-41F71413DB50}" type="datetimeFigureOut">
               <a:rPr lang="ko-KR" altLang="en-US" smtClean="0"/>
-              <a:t>2018-11-08</a:t>
+              <a:t>2018-11-09</a:t>
             </a:fld>
             <a:endParaRPr lang="ko-KR" altLang="en-US"/>
           </a:p>
@@ -770,7 +770,7 @@
           <a:p>
             <a:fld id="{F00B919D-B4A1-482F-AA08-41F71413DB50}" type="datetimeFigureOut">
               <a:rPr lang="ko-KR" altLang="en-US" smtClean="0"/>
-              <a:t>2018-11-08</a:t>
+              <a:t>2018-11-09</a:t>
             </a:fld>
             <a:endParaRPr lang="ko-KR" altLang="en-US"/>
           </a:p>
@@ -1016,7 +1016,7 @@
           <a:p>
             <a:fld id="{F00B919D-B4A1-482F-AA08-41F71413DB50}" type="datetimeFigureOut">
               <a:rPr lang="ko-KR" altLang="en-US" smtClean="0"/>
-              <a:t>2018-11-08</a:t>
+              <a:t>2018-11-09</a:t>
             </a:fld>
             <a:endParaRPr lang="ko-KR" altLang="en-US"/>
           </a:p>
@@ -1248,7 +1248,7 @@
           <a:p>
             <a:fld id="{F00B919D-B4A1-482F-AA08-41F71413DB50}" type="datetimeFigureOut">
               <a:rPr lang="ko-KR" altLang="en-US" smtClean="0"/>
-              <a:t>2018-11-08</a:t>
+              <a:t>2018-11-09</a:t>
             </a:fld>
             <a:endParaRPr lang="ko-KR" altLang="en-US"/>
           </a:p>
@@ -1615,7 +1615,7 @@
           <a:p>
             <a:fld id="{F00B919D-B4A1-482F-AA08-41F71413DB50}" type="datetimeFigureOut">
               <a:rPr lang="ko-KR" altLang="en-US" smtClean="0"/>
-              <a:t>2018-11-08</a:t>
+              <a:t>2018-11-09</a:t>
             </a:fld>
             <a:endParaRPr lang="ko-KR" altLang="en-US"/>
           </a:p>
@@ -1733,7 +1733,7 @@
           <a:p>
             <a:fld id="{F00B919D-B4A1-482F-AA08-41F71413DB50}" type="datetimeFigureOut">
               <a:rPr lang="ko-KR" altLang="en-US" smtClean="0"/>
-              <a:t>2018-11-08</a:t>
+              <a:t>2018-11-09</a:t>
             </a:fld>
             <a:endParaRPr lang="ko-KR" altLang="en-US"/>
           </a:p>
@@ -1828,7 +1828,7 @@
           <a:p>
             <a:fld id="{F00B919D-B4A1-482F-AA08-41F71413DB50}" type="datetimeFigureOut">
               <a:rPr lang="ko-KR" altLang="en-US" smtClean="0"/>
-              <a:t>2018-11-08</a:t>
+              <a:t>2018-11-09</a:t>
             </a:fld>
             <a:endParaRPr lang="ko-KR" altLang="en-US"/>
           </a:p>
@@ -2105,7 +2105,7 @@
           <a:p>
             <a:fld id="{F00B919D-B4A1-482F-AA08-41F71413DB50}" type="datetimeFigureOut">
               <a:rPr lang="ko-KR" altLang="en-US" smtClean="0"/>
-              <a:t>2018-11-08</a:t>
+              <a:t>2018-11-09</a:t>
             </a:fld>
             <a:endParaRPr lang="ko-KR" altLang="en-US"/>
           </a:p>
@@ -2358,7 +2358,7 @@
           <a:p>
             <a:fld id="{F00B919D-B4A1-482F-AA08-41F71413DB50}" type="datetimeFigureOut">
               <a:rPr lang="ko-KR" altLang="en-US" smtClean="0"/>
-              <a:t>2018-11-08</a:t>
+              <a:t>2018-11-09</a:t>
             </a:fld>
             <a:endParaRPr lang="ko-KR" altLang="en-US"/>
           </a:p>
@@ -2571,7 +2571,7 @@
           <a:p>
             <a:fld id="{F00B919D-B4A1-482F-AA08-41F71413DB50}" type="datetimeFigureOut">
               <a:rPr lang="ko-KR" altLang="en-US" smtClean="0"/>
-              <a:t>2018-11-08</a:t>
+              <a:t>2018-11-09</a:t>
             </a:fld>
             <a:endParaRPr lang="ko-KR" altLang="en-US"/>
           </a:p>
@@ -3133,6 +3133,143 @@
           </a:p>
         </p:txBody>
       </p:sp>
+      <p:sp>
+        <p:nvSpPr>
+          <p:cNvPr id="7" name="타원 6"/>
+          <p:cNvSpPr/>
+          <p:nvPr/>
+        </p:nvSpPr>
+        <p:spPr>
+          <a:xfrm>
+            <a:off x="648391" y="3404061"/>
+            <a:ext cx="1022466" cy="1022466"/>
+          </a:xfrm>
+          <a:prstGeom prst="ellipse">
+            <a:avLst/>
+          </a:prstGeom>
+          <a:ln>
+            <a:noFill/>
+          </a:ln>
+        </p:spPr>
+        <p:style>
+          <a:lnRef idx="2">
+            <a:schemeClr val="accent1">
+              <a:shade val="50000"/>
+            </a:schemeClr>
+          </a:lnRef>
+          <a:fillRef idx="1">
+            <a:schemeClr val="accent1"/>
+          </a:fillRef>
+          <a:effectRef idx="0">
+            <a:schemeClr val="accent1"/>
+          </a:effectRef>
+          <a:fontRef idx="minor">
+            <a:schemeClr val="lt1"/>
+          </a:fontRef>
+        </p:style>
+        <p:txBody>
+          <a:bodyPr rtlCol="0" anchor="ctr"/>
+          <a:lstStyle/>
+          <a:p>
+            <a:pPr algn="ctr"/>
+            <a:endParaRPr lang="ko-KR" altLang="en-US"/>
+          </a:p>
+        </p:txBody>
+      </p:sp>
+      <p:sp>
+        <p:nvSpPr>
+          <p:cNvPr id="8" name="타원 7"/>
+          <p:cNvSpPr/>
+          <p:nvPr/>
+        </p:nvSpPr>
+        <p:spPr>
+          <a:xfrm>
+            <a:off x="2348344" y="3404061"/>
+            <a:ext cx="1022466" cy="1022466"/>
+          </a:xfrm>
+          <a:prstGeom prst="ellipse">
+            <a:avLst/>
+          </a:prstGeom>
+          <a:solidFill>
+            <a:srgbClr val="FF0000"/>
+          </a:solidFill>
+          <a:ln>
+            <a:noFill/>
+          </a:ln>
+        </p:spPr>
+        <p:style>
+          <a:lnRef idx="2">
+            <a:schemeClr val="accent1">
+              <a:shade val="50000"/>
+            </a:schemeClr>
+          </a:lnRef>
+          <a:fillRef idx="1">
+            <a:schemeClr val="accent1"/>
+          </a:fillRef>
+          <a:effectRef idx="0">
+            <a:schemeClr val="accent1"/>
+          </a:effectRef>
+          <a:fontRef idx="minor">
+            <a:schemeClr val="lt1"/>
+          </a:fontRef>
+        </p:style>
+        <p:txBody>
+          <a:bodyPr rtlCol="0" anchor="ctr"/>
+          <a:lstStyle/>
+          <a:p>
+            <a:pPr algn="ctr"/>
+            <a:endParaRPr lang="ko-KR" altLang="en-US"/>
+          </a:p>
+        </p:txBody>
+      </p:sp>
+      <p:sp>
+        <p:nvSpPr>
+          <p:cNvPr id="9" name="직사각형 8"/>
+          <p:cNvSpPr/>
+          <p:nvPr/>
+        </p:nvSpPr>
+        <p:spPr>
+          <a:xfrm>
+            <a:off x="540327" y="372893"/>
+            <a:ext cx="4305993" cy="2004547"/>
+          </a:xfrm>
+          <a:prstGeom prst="rect">
+            <a:avLst/>
+          </a:prstGeom>
+          <a:solidFill>
+            <a:srgbClr val="FFE699"/>
+          </a:solidFill>
+          <a:ln>
+            <a:solidFill>
+              <a:srgbClr val="FFFF00"/>
+            </a:solidFill>
+          </a:ln>
+        </p:spPr>
+        <p:style>
+          <a:lnRef idx="2">
+            <a:schemeClr val="accent1">
+              <a:shade val="50000"/>
+            </a:schemeClr>
+          </a:lnRef>
+          <a:fillRef idx="1">
+            <a:schemeClr val="accent1"/>
+          </a:fillRef>
+          <a:effectRef idx="0">
+            <a:schemeClr val="accent1"/>
+          </a:effectRef>
+          <a:fontRef idx="minor">
+            <a:schemeClr val="lt1"/>
+          </a:fontRef>
+        </p:style>
+        <p:txBody>
+          <a:bodyPr rtlCol="0" anchor="ctr"/>
+          <a:lstStyle/>
+          <a:p>
+            <a:pPr algn="ctr"/>
+            <a:endParaRPr lang="ko-KR" altLang="en-US"/>
+          </a:p>
+        </p:txBody>
+      </p:sp>
     </p:spTree>
     <p:extLst>
       <p:ext uri="{BB962C8B-B14F-4D97-AF65-F5344CB8AC3E}">
@@ -4171,210 +4308,6 @@
       </p:sp>
       <p:sp>
         <p:nvSpPr>
-          <p:cNvPr id="32" name="타원 31"/>
-          <p:cNvSpPr/>
-          <p:nvPr/>
-        </p:nvSpPr>
-        <p:spPr>
-          <a:xfrm>
-            <a:off x="2926557" y="5690280"/>
-            <a:ext cx="744387" cy="744387"/>
-          </a:xfrm>
-          <a:prstGeom prst="ellipse">
-            <a:avLst/>
-          </a:prstGeom>
-          <a:solidFill>
-            <a:srgbClr val="FF0000"/>
-          </a:solidFill>
-          <a:ln>
-            <a:solidFill>
-              <a:srgbClr val="C00000"/>
-            </a:solidFill>
-          </a:ln>
-        </p:spPr>
-        <p:style>
-          <a:lnRef idx="2">
-            <a:schemeClr val="accent1">
-              <a:shade val="50000"/>
-            </a:schemeClr>
-          </a:lnRef>
-          <a:fillRef idx="1">
-            <a:schemeClr val="accent1"/>
-          </a:fillRef>
-          <a:effectRef idx="0">
-            <a:schemeClr val="accent1"/>
-          </a:effectRef>
-          <a:fontRef idx="minor">
-            <a:schemeClr val="lt1"/>
-          </a:fontRef>
-        </p:style>
-        <p:txBody>
-          <a:bodyPr rtlCol="0" anchor="ctr"/>
-          <a:lstStyle/>
-          <a:p>
-            <a:pPr algn="ctr"/>
-            <a:endParaRPr lang="ko-KR" altLang="en-US"/>
-          </a:p>
-        </p:txBody>
-      </p:sp>
-      <p:sp>
-        <p:nvSpPr>
-          <p:cNvPr id="33" name="타원 32"/>
-          <p:cNvSpPr/>
-          <p:nvPr/>
-        </p:nvSpPr>
-        <p:spPr>
-          <a:xfrm>
-            <a:off x="8915781" y="5690280"/>
-            <a:ext cx="744387" cy="744387"/>
-          </a:xfrm>
-          <a:prstGeom prst="ellipse">
-            <a:avLst/>
-          </a:prstGeom>
-          <a:solidFill>
-            <a:srgbClr val="FF0000"/>
-          </a:solidFill>
-          <a:ln>
-            <a:solidFill>
-              <a:srgbClr val="C00000"/>
-            </a:solidFill>
-          </a:ln>
-        </p:spPr>
-        <p:style>
-          <a:lnRef idx="2">
-            <a:schemeClr val="accent1">
-              <a:shade val="50000"/>
-            </a:schemeClr>
-          </a:lnRef>
-          <a:fillRef idx="1">
-            <a:schemeClr val="accent1"/>
-          </a:fillRef>
-          <a:effectRef idx="0">
-            <a:schemeClr val="accent1"/>
-          </a:effectRef>
-          <a:fontRef idx="minor">
-            <a:schemeClr val="lt1"/>
-          </a:fontRef>
-        </p:style>
-        <p:txBody>
-          <a:bodyPr rtlCol="0" anchor="ctr"/>
-          <a:lstStyle/>
-          <a:p>
-            <a:pPr algn="ctr"/>
-            <a:endParaRPr lang="ko-KR" altLang="en-US"/>
-          </a:p>
-        </p:txBody>
-      </p:sp>
-      <p:sp>
-        <p:nvSpPr>
-          <p:cNvPr id="34" name="타원 33"/>
-          <p:cNvSpPr/>
-          <p:nvPr/>
-        </p:nvSpPr>
-        <p:spPr>
-          <a:xfrm>
-            <a:off x="3091625" y="4231848"/>
-            <a:ext cx="480702" cy="480702"/>
-          </a:xfrm>
-          <a:prstGeom prst="ellipse">
-            <a:avLst/>
-          </a:prstGeom>
-          <a:solidFill>
-            <a:schemeClr val="accent4">
-              <a:lumMod val="40000"/>
-              <a:lumOff val="60000"/>
-            </a:schemeClr>
-          </a:solidFill>
-          <a:ln>
-            <a:solidFill>
-              <a:schemeClr val="accent1">
-                <a:lumMod val="20000"/>
-                <a:lumOff val="80000"/>
-              </a:schemeClr>
-            </a:solidFill>
-          </a:ln>
-        </p:spPr>
-        <p:style>
-          <a:lnRef idx="2">
-            <a:schemeClr val="accent1">
-              <a:shade val="50000"/>
-            </a:schemeClr>
-          </a:lnRef>
-          <a:fillRef idx="1">
-            <a:schemeClr val="accent1"/>
-          </a:fillRef>
-          <a:effectRef idx="0">
-            <a:schemeClr val="accent1"/>
-          </a:effectRef>
-          <a:fontRef idx="minor">
-            <a:schemeClr val="lt1"/>
-          </a:fontRef>
-        </p:style>
-        <p:txBody>
-          <a:bodyPr rtlCol="0" anchor="ctr"/>
-          <a:lstStyle/>
-          <a:p>
-            <a:pPr algn="ctr"/>
-            <a:endParaRPr lang="ko-KR" altLang="en-US"/>
-          </a:p>
-        </p:txBody>
-      </p:sp>
-      <p:sp>
-        <p:nvSpPr>
-          <p:cNvPr id="35" name="타원 34"/>
-          <p:cNvSpPr/>
-          <p:nvPr/>
-        </p:nvSpPr>
-        <p:spPr>
-          <a:xfrm>
-            <a:off x="8908759" y="4231676"/>
-            <a:ext cx="480702" cy="480702"/>
-          </a:xfrm>
-          <a:prstGeom prst="ellipse">
-            <a:avLst/>
-          </a:prstGeom>
-          <a:solidFill>
-            <a:schemeClr val="accent1">
-              <a:lumMod val="60000"/>
-              <a:lumOff val="40000"/>
-            </a:schemeClr>
-          </a:solidFill>
-          <a:ln>
-            <a:solidFill>
-              <a:schemeClr val="accent4">
-                <a:lumMod val="60000"/>
-                <a:lumOff val="40000"/>
-              </a:schemeClr>
-            </a:solidFill>
-          </a:ln>
-        </p:spPr>
-        <p:style>
-          <a:lnRef idx="2">
-            <a:schemeClr val="accent1">
-              <a:shade val="50000"/>
-            </a:schemeClr>
-          </a:lnRef>
-          <a:fillRef idx="1">
-            <a:schemeClr val="accent1"/>
-          </a:fillRef>
-          <a:effectRef idx="0">
-            <a:schemeClr val="accent1"/>
-          </a:effectRef>
-          <a:fontRef idx="minor">
-            <a:schemeClr val="lt1"/>
-          </a:fontRef>
-        </p:style>
-        <p:txBody>
-          <a:bodyPr rtlCol="0" anchor="ctr"/>
-          <a:lstStyle/>
-          <a:p>
-            <a:pPr algn="ctr"/>
-            <a:endParaRPr lang="ko-KR" altLang="en-US"/>
-          </a:p>
-        </p:txBody>
-      </p:sp>
-      <p:sp>
-        <p:nvSpPr>
           <p:cNvPr id="36" name="직사각형 35"/>
           <p:cNvSpPr/>
           <p:nvPr/>
@@ -4393,99 +4326,6 @@
           <a:ln>
             <a:solidFill>
               <a:schemeClr val="tx1"/>
-            </a:solidFill>
-          </a:ln>
-        </p:spPr>
-        <p:style>
-          <a:lnRef idx="2">
-            <a:schemeClr val="accent1">
-              <a:shade val="50000"/>
-            </a:schemeClr>
-          </a:lnRef>
-          <a:fillRef idx="1">
-            <a:schemeClr val="accent1"/>
-          </a:fillRef>
-          <a:effectRef idx="0">
-            <a:schemeClr val="accent1"/>
-          </a:effectRef>
-          <a:fontRef idx="minor">
-            <a:schemeClr val="lt1"/>
-          </a:fontRef>
-        </p:style>
-        <p:txBody>
-          <a:bodyPr rtlCol="0" anchor="ctr"/>
-          <a:lstStyle/>
-          <a:p>
-            <a:pPr algn="ctr"/>
-            <a:endParaRPr lang="ko-KR" altLang="en-US"/>
-          </a:p>
-        </p:txBody>
-      </p:sp>
-      <p:sp>
-        <p:nvSpPr>
-          <p:cNvPr id="38" name="직사각형 37"/>
-          <p:cNvSpPr/>
-          <p:nvPr/>
-        </p:nvSpPr>
-        <p:spPr>
-          <a:xfrm>
-            <a:off x="5478857" y="6172237"/>
-            <a:ext cx="689389" cy="524859"/>
-          </a:xfrm>
-          <a:prstGeom prst="rect">
-            <a:avLst/>
-          </a:prstGeom>
-          <a:solidFill>
-            <a:schemeClr val="bg1"/>
-          </a:solidFill>
-        </p:spPr>
-        <p:style>
-          <a:lnRef idx="2">
-            <a:schemeClr val="accent1">
-              <a:shade val="50000"/>
-            </a:schemeClr>
-          </a:lnRef>
-          <a:fillRef idx="1">
-            <a:schemeClr val="accent1"/>
-          </a:fillRef>
-          <a:effectRef idx="0">
-            <a:schemeClr val="accent1"/>
-          </a:effectRef>
-          <a:fontRef idx="minor">
-            <a:schemeClr val="lt1"/>
-          </a:fontRef>
-        </p:style>
-        <p:txBody>
-          <a:bodyPr rtlCol="0" anchor="ctr"/>
-          <a:lstStyle/>
-          <a:p>
-            <a:pPr algn="ctr"/>
-            <a:endParaRPr lang="ko-KR" altLang="en-US"/>
-          </a:p>
-        </p:txBody>
-      </p:sp>
-      <p:sp>
-        <p:nvSpPr>
-          <p:cNvPr id="39" name="직사각형 38"/>
-          <p:cNvSpPr/>
-          <p:nvPr/>
-        </p:nvSpPr>
-        <p:spPr>
-          <a:xfrm>
-            <a:off x="6168246" y="6172236"/>
-            <a:ext cx="689389" cy="524859"/>
-          </a:xfrm>
-          <a:prstGeom prst="rect">
-            <a:avLst/>
-          </a:prstGeom>
-          <a:solidFill>
-            <a:schemeClr val="bg1"/>
-          </a:solidFill>
-          <a:ln>
-            <a:solidFill>
-              <a:schemeClr val="accent4">
-                <a:lumMod val="75000"/>
-              </a:schemeClr>
             </a:solidFill>
           </a:ln>
         </p:spPr>
@@ -5034,6 +4874,442 @@
           <a:chExt cx="0" cy="0"/>
         </a:xfrm>
       </p:grpSpPr>
+      <p:pic>
+        <p:nvPicPr>
+          <p:cNvPr id="2" name="그림 1"/>
+          <p:cNvPicPr>
+            <a:picLocks/>
+          </p:cNvPicPr>
+          <p:nvPr/>
+        </p:nvPicPr>
+        <p:blipFill rotWithShape="1">
+          <a:blip r:embed="rId2">
+            <a:extLst>
+              <a:ext uri="{28A0092B-C50C-407E-A947-70E740481C1C}">
+                <a14:useLocalDpi xmlns:a14="http://schemas.microsoft.com/office/drawing/2010/main" val="0"/>
+              </a:ext>
+            </a:extLst>
+          </a:blip>
+          <a:srcRect l="3773" t="5383" r="3666" b="18812"/>
+          <a:stretch/>
+        </p:blipFill>
+        <p:spPr>
+          <a:xfrm>
+            <a:off x="374071" y="290945"/>
+            <a:ext cx="1440000" cy="1440000"/>
+          </a:xfrm>
+          <a:prstGeom prst="rect">
+            <a:avLst/>
+          </a:prstGeom>
+        </p:spPr>
+      </p:pic>
+      <p:pic>
+        <p:nvPicPr>
+          <p:cNvPr id="3" name="그림 2"/>
+          <p:cNvPicPr>
+            <a:picLocks/>
+          </p:cNvPicPr>
+          <p:nvPr/>
+        </p:nvPicPr>
+        <p:blipFill rotWithShape="1">
+          <a:blip r:embed="rId3">
+            <a:extLst>
+              <a:ext uri="{28A0092B-C50C-407E-A947-70E740481C1C}">
+                <a14:useLocalDpi xmlns:a14="http://schemas.microsoft.com/office/drawing/2010/main" val="0"/>
+              </a:ext>
+            </a:extLst>
+          </a:blip>
+          <a:srcRect l="4193" t="5258" r="3633" b="17748"/>
+          <a:stretch/>
+        </p:blipFill>
+        <p:spPr>
+          <a:xfrm>
+            <a:off x="2693323" y="374073"/>
+            <a:ext cx="1440000" cy="1440000"/>
+          </a:xfrm>
+          <a:prstGeom prst="rect">
+            <a:avLst/>
+          </a:prstGeom>
+        </p:spPr>
+      </p:pic>
+      <p:pic>
+        <p:nvPicPr>
+          <p:cNvPr id="4" name="그림 3"/>
+          <p:cNvPicPr>
+            <a:picLocks/>
+          </p:cNvPicPr>
+          <p:nvPr/>
+        </p:nvPicPr>
+        <p:blipFill rotWithShape="1">
+          <a:blip r:embed="rId4">
+            <a:extLst>
+              <a:ext uri="{28A0092B-C50C-407E-A947-70E740481C1C}">
+                <a14:useLocalDpi xmlns:a14="http://schemas.microsoft.com/office/drawing/2010/main" val="0"/>
+              </a:ext>
+            </a:extLst>
+          </a:blip>
+          <a:srcRect t="4636" b="17218"/>
+          <a:stretch/>
+        </p:blipFill>
+        <p:spPr>
+          <a:xfrm>
+            <a:off x="8445733" y="3729349"/>
+            <a:ext cx="1440000" cy="1440000"/>
+          </a:xfrm>
+          <a:prstGeom prst="rect">
+            <a:avLst/>
+          </a:prstGeom>
+        </p:spPr>
+      </p:pic>
+      <p:pic>
+        <p:nvPicPr>
+          <p:cNvPr id="5" name="그림 4"/>
+          <p:cNvPicPr>
+            <a:picLocks/>
+          </p:cNvPicPr>
+          <p:nvPr/>
+        </p:nvPicPr>
+        <p:blipFill rotWithShape="1">
+          <a:blip r:embed="rId5">
+            <a:extLst>
+              <a:ext uri="{28A0092B-C50C-407E-A947-70E740481C1C}">
+                <a14:useLocalDpi xmlns:a14="http://schemas.microsoft.com/office/drawing/2010/main" val="0"/>
+              </a:ext>
+            </a:extLst>
+          </a:blip>
+          <a:srcRect l="4079" t="6174" r="4997" b="17494"/>
+          <a:stretch/>
+        </p:blipFill>
+        <p:spPr>
+          <a:xfrm>
+            <a:off x="4671751" y="133003"/>
+            <a:ext cx="1440000" cy="1440000"/>
+          </a:xfrm>
+          <a:prstGeom prst="rect">
+            <a:avLst/>
+          </a:prstGeom>
+        </p:spPr>
+      </p:pic>
+      <p:pic>
+        <p:nvPicPr>
+          <p:cNvPr id="6" name="그림 5"/>
+          <p:cNvPicPr>
+            <a:picLocks/>
+          </p:cNvPicPr>
+          <p:nvPr/>
+        </p:nvPicPr>
+        <p:blipFill rotWithShape="1">
+          <a:blip r:embed="rId6">
+            <a:extLst>
+              <a:ext uri="{28A0092B-C50C-407E-A947-70E740481C1C}">
+                <a14:useLocalDpi xmlns:a14="http://schemas.microsoft.com/office/drawing/2010/main" val="0"/>
+              </a:ext>
+            </a:extLst>
+          </a:blip>
+          <a:srcRect l="3947" t="5488" r="4175" b="17225"/>
+          <a:stretch/>
+        </p:blipFill>
+        <p:spPr>
+          <a:xfrm>
+            <a:off x="6450675" y="271111"/>
+            <a:ext cx="1440000" cy="1440000"/>
+          </a:xfrm>
+          <a:prstGeom prst="rect">
+            <a:avLst/>
+          </a:prstGeom>
+        </p:spPr>
+      </p:pic>
+      <p:pic>
+        <p:nvPicPr>
+          <p:cNvPr id="7" name="그림 6"/>
+          <p:cNvPicPr>
+            <a:picLocks/>
+          </p:cNvPicPr>
+          <p:nvPr/>
+        </p:nvPicPr>
+        <p:blipFill rotWithShape="1">
+          <a:blip r:embed="rId7">
+            <a:extLst>
+              <a:ext uri="{28A0092B-C50C-407E-A947-70E740481C1C}">
+                <a14:useLocalDpi xmlns:a14="http://schemas.microsoft.com/office/drawing/2010/main" val="0"/>
+              </a:ext>
+            </a:extLst>
+          </a:blip>
+          <a:srcRect l="3685" t="4602" r="4067" b="18712"/>
+          <a:stretch/>
+        </p:blipFill>
+        <p:spPr>
+          <a:xfrm>
+            <a:off x="8587048" y="374073"/>
+            <a:ext cx="1440000" cy="1440000"/>
+          </a:xfrm>
+          <a:prstGeom prst="rect">
+            <a:avLst/>
+          </a:prstGeom>
+        </p:spPr>
+      </p:pic>
+      <p:pic>
+        <p:nvPicPr>
+          <p:cNvPr id="8" name="그림 7"/>
+          <p:cNvPicPr>
+            <a:picLocks/>
+          </p:cNvPicPr>
+          <p:nvPr/>
+        </p:nvPicPr>
+        <p:blipFill rotWithShape="1">
+          <a:blip r:embed="rId8">
+            <a:extLst>
+              <a:ext uri="{28A0092B-C50C-407E-A947-70E740481C1C}">
+                <a14:useLocalDpi xmlns:a14="http://schemas.microsoft.com/office/drawing/2010/main" val="0"/>
+              </a:ext>
+            </a:extLst>
+          </a:blip>
+          <a:srcRect l="1677" t="4720" r="4661" b="18326"/>
+          <a:stretch/>
+        </p:blipFill>
+        <p:spPr>
+          <a:xfrm>
+            <a:off x="764001" y="2092084"/>
+            <a:ext cx="1440000" cy="1440000"/>
+          </a:xfrm>
+          <a:prstGeom prst="rect">
+            <a:avLst/>
+          </a:prstGeom>
+        </p:spPr>
+      </p:pic>
+      <p:pic>
+        <p:nvPicPr>
+          <p:cNvPr id="9" name="그림 8"/>
+          <p:cNvPicPr>
+            <a:picLocks/>
+          </p:cNvPicPr>
+          <p:nvPr/>
+        </p:nvPicPr>
+        <p:blipFill rotWithShape="1">
+          <a:blip r:embed="rId9">
+            <a:extLst>
+              <a:ext uri="{28A0092B-C50C-407E-A947-70E740481C1C}">
+                <a14:useLocalDpi xmlns:a14="http://schemas.microsoft.com/office/drawing/2010/main" val="0"/>
+              </a:ext>
+            </a:extLst>
+          </a:blip>
+          <a:srcRect l="4008" t="4457" r="4787" b="18193"/>
+          <a:stretch/>
+        </p:blipFill>
+        <p:spPr>
+          <a:xfrm>
+            <a:off x="2693323" y="2092084"/>
+            <a:ext cx="1440000" cy="1440000"/>
+          </a:xfrm>
+          <a:prstGeom prst="rect">
+            <a:avLst/>
+          </a:prstGeom>
+        </p:spPr>
+      </p:pic>
+      <p:pic>
+        <p:nvPicPr>
+          <p:cNvPr id="10" name="그림 9"/>
+          <p:cNvPicPr>
+            <a:picLocks/>
+          </p:cNvPicPr>
+          <p:nvPr/>
+        </p:nvPicPr>
+        <p:blipFill rotWithShape="1">
+          <a:blip r:embed="rId10">
+            <a:extLst>
+              <a:ext uri="{28A0092B-C50C-407E-A947-70E740481C1C}">
+                <a14:useLocalDpi xmlns:a14="http://schemas.microsoft.com/office/drawing/2010/main" val="0"/>
+              </a:ext>
+            </a:extLst>
+          </a:blip>
+          <a:srcRect l="4130" t="6022" r="5035" b="17938"/>
+          <a:stretch/>
+        </p:blipFill>
+        <p:spPr>
+          <a:xfrm>
+            <a:off x="4846321" y="1961801"/>
+            <a:ext cx="1440000" cy="1440000"/>
+          </a:xfrm>
+          <a:prstGeom prst="rect">
+            <a:avLst/>
+          </a:prstGeom>
+        </p:spPr>
+      </p:pic>
+      <p:pic>
+        <p:nvPicPr>
+          <p:cNvPr id="11" name="그림 10"/>
+          <p:cNvPicPr>
+            <a:picLocks/>
+          </p:cNvPicPr>
+          <p:nvPr/>
+        </p:nvPicPr>
+        <p:blipFill rotWithShape="1">
+          <a:blip r:embed="rId11">
+            <a:extLst>
+              <a:ext uri="{28A0092B-C50C-407E-A947-70E740481C1C}">
+                <a14:useLocalDpi xmlns:a14="http://schemas.microsoft.com/office/drawing/2010/main" val="0"/>
+              </a:ext>
+            </a:extLst>
+          </a:blip>
+          <a:srcRect l="4441" t="4937" r="4459" b="17451"/>
+          <a:stretch/>
+        </p:blipFill>
+        <p:spPr>
+          <a:xfrm>
+            <a:off x="6689849" y="2026407"/>
+            <a:ext cx="1440000" cy="1440000"/>
+          </a:xfrm>
+          <a:prstGeom prst="rect">
+            <a:avLst/>
+          </a:prstGeom>
+        </p:spPr>
+      </p:pic>
+      <p:pic>
+        <p:nvPicPr>
+          <p:cNvPr id="12" name="그림 11"/>
+          <p:cNvPicPr>
+            <a:picLocks/>
+          </p:cNvPicPr>
+          <p:nvPr/>
+        </p:nvPicPr>
+        <p:blipFill rotWithShape="1">
+          <a:blip r:embed="rId12">
+            <a:extLst>
+              <a:ext uri="{28A0092B-C50C-407E-A947-70E740481C1C}">
+                <a14:useLocalDpi xmlns:a14="http://schemas.microsoft.com/office/drawing/2010/main" val="0"/>
+              </a:ext>
+            </a:extLst>
+          </a:blip>
+          <a:srcRect l="4030" t="4125" r="3389" b="17515"/>
+          <a:stretch/>
+        </p:blipFill>
+        <p:spPr>
+          <a:xfrm>
+            <a:off x="8587048" y="1961801"/>
+            <a:ext cx="1440000" cy="1440000"/>
+          </a:xfrm>
+          <a:prstGeom prst="rect">
+            <a:avLst/>
+          </a:prstGeom>
+        </p:spPr>
+      </p:pic>
+      <p:pic>
+        <p:nvPicPr>
+          <p:cNvPr id="13" name="그림 12"/>
+          <p:cNvPicPr>
+            <a:picLocks/>
+          </p:cNvPicPr>
+          <p:nvPr/>
+        </p:nvPicPr>
+        <p:blipFill rotWithShape="1">
+          <a:blip r:embed="rId13">
+            <a:extLst>
+              <a:ext uri="{28A0092B-C50C-407E-A947-70E740481C1C}">
+                <a14:useLocalDpi xmlns:a14="http://schemas.microsoft.com/office/drawing/2010/main" val="0"/>
+              </a:ext>
+            </a:extLst>
+          </a:blip>
+          <a:srcRect l="6339" t="4392" r="6989" b="17603"/>
+          <a:stretch/>
+        </p:blipFill>
+        <p:spPr>
+          <a:xfrm>
+            <a:off x="831271" y="3893223"/>
+            <a:ext cx="1440000" cy="1440000"/>
+          </a:xfrm>
+          <a:prstGeom prst="rect">
+            <a:avLst/>
+          </a:prstGeom>
+        </p:spPr>
+      </p:pic>
+      <p:pic>
+        <p:nvPicPr>
+          <p:cNvPr id="14" name="그림 13"/>
+          <p:cNvPicPr>
+            <a:picLocks/>
+          </p:cNvPicPr>
+          <p:nvPr/>
+        </p:nvPicPr>
+        <p:blipFill rotWithShape="1">
+          <a:blip r:embed="rId14">
+            <a:extLst>
+              <a:ext uri="{28A0092B-C50C-407E-A947-70E740481C1C}">
+                <a14:useLocalDpi xmlns:a14="http://schemas.microsoft.com/office/drawing/2010/main" val="0"/>
+              </a:ext>
+            </a:extLst>
+          </a:blip>
+          <a:srcRect l="6926" r="8169"/>
+          <a:stretch/>
+        </p:blipFill>
+        <p:spPr>
+          <a:xfrm>
+            <a:off x="3071914" y="4139397"/>
+            <a:ext cx="1440000" cy="1440000"/>
+          </a:xfrm>
+          <a:prstGeom prst="rect">
+            <a:avLst/>
+          </a:prstGeom>
+        </p:spPr>
+      </p:pic>
+      <p:pic>
+        <p:nvPicPr>
+          <p:cNvPr id="15" name="그림 14"/>
+          <p:cNvPicPr>
+            <a:picLocks/>
+          </p:cNvPicPr>
+          <p:nvPr/>
+        </p:nvPicPr>
+        <p:blipFill>
+          <a:blip r:embed="rId15">
+            <a:extLst>
+              <a:ext uri="{28A0092B-C50C-407E-A947-70E740481C1C}">
+                <a14:useLocalDpi xmlns:a14="http://schemas.microsoft.com/office/drawing/2010/main" val="0"/>
+              </a:ext>
+            </a:extLst>
+          </a:blip>
+          <a:stretch>
+            <a:fillRect/>
+          </a:stretch>
+        </p:blipFill>
+        <p:spPr>
+          <a:xfrm>
+            <a:off x="4618634" y="4034053"/>
+            <a:ext cx="1440000" cy="1440000"/>
+          </a:xfrm>
+          <a:prstGeom prst="rect">
+            <a:avLst/>
+          </a:prstGeom>
+        </p:spPr>
+      </p:pic>
+      <p:pic>
+        <p:nvPicPr>
+          <p:cNvPr id="16" name="그림 15"/>
+          <p:cNvPicPr>
+            <a:picLocks/>
+          </p:cNvPicPr>
+          <p:nvPr/>
+        </p:nvPicPr>
+        <p:blipFill rotWithShape="1">
+          <a:blip r:embed="rId16">
+            <a:extLst>
+              <a:ext uri="{28A0092B-C50C-407E-A947-70E740481C1C}">
+                <a14:useLocalDpi xmlns:a14="http://schemas.microsoft.com/office/drawing/2010/main" val="0"/>
+              </a:ext>
+            </a:extLst>
+          </a:blip>
+          <a:srcRect l="6813" r="5073"/>
+          <a:stretch/>
+        </p:blipFill>
+        <p:spPr>
+          <a:xfrm>
+            <a:off x="6532183" y="3893223"/>
+            <a:ext cx="1440000" cy="1440000"/>
+          </a:xfrm>
+          <a:prstGeom prst="rect">
+            <a:avLst/>
+          </a:prstGeom>
+        </p:spPr>
+      </p:pic>
     </p:spTree>
     <p:extLst>
       <p:ext uri="{BB962C8B-B14F-4D97-AF65-F5344CB8AC3E}">
@@ -5064,6 +5340,696 @@
           <a:chExt cx="0" cy="0"/>
         </a:xfrm>
       </p:grpSpPr>
+      <p:sp>
+        <p:nvSpPr>
+          <p:cNvPr id="2" name="직사각형 1"/>
+          <p:cNvSpPr/>
+          <p:nvPr/>
+        </p:nvSpPr>
+        <p:spPr>
+          <a:xfrm>
+            <a:off x="1970116" y="814647"/>
+            <a:ext cx="8429106" cy="4912822"/>
+          </a:xfrm>
+          <a:prstGeom prst="rect">
+            <a:avLst/>
+          </a:prstGeom>
+          <a:solidFill>
+            <a:schemeClr val="tx1"/>
+          </a:solidFill>
+          <a:ln>
+            <a:solidFill>
+              <a:schemeClr val="tx1"/>
+            </a:solidFill>
+          </a:ln>
+        </p:spPr>
+        <p:style>
+          <a:lnRef idx="2">
+            <a:schemeClr val="accent1">
+              <a:shade val="50000"/>
+            </a:schemeClr>
+          </a:lnRef>
+          <a:fillRef idx="1">
+            <a:schemeClr val="accent1"/>
+          </a:fillRef>
+          <a:effectRef idx="0">
+            <a:schemeClr val="accent1"/>
+          </a:effectRef>
+          <a:fontRef idx="minor">
+            <a:schemeClr val="lt1"/>
+          </a:fontRef>
+        </p:style>
+        <p:txBody>
+          <a:bodyPr rtlCol="0" anchor="ctr"/>
+          <a:lstStyle/>
+          <a:p>
+            <a:pPr algn="ctr"/>
+            <a:endParaRPr lang="ko-KR" altLang="en-US"/>
+          </a:p>
+        </p:txBody>
+      </p:sp>
+      <p:sp>
+        <p:nvSpPr>
+          <p:cNvPr id="4" name="모서리가 둥근 직사각형 3"/>
+          <p:cNvSpPr/>
+          <p:nvPr/>
+        </p:nvSpPr>
+        <p:spPr>
+          <a:xfrm>
+            <a:off x="5590309" y="814647"/>
+            <a:ext cx="1188719" cy="540328"/>
+          </a:xfrm>
+          <a:prstGeom prst="roundRect">
+            <a:avLst/>
+          </a:prstGeom>
+          <a:solidFill>
+            <a:schemeClr val="bg1"/>
+          </a:solidFill>
+          <a:ln>
+            <a:solidFill>
+              <a:schemeClr val="tx1"/>
+            </a:solidFill>
+          </a:ln>
+        </p:spPr>
+        <p:style>
+          <a:lnRef idx="2">
+            <a:schemeClr val="accent1">
+              <a:shade val="50000"/>
+            </a:schemeClr>
+          </a:lnRef>
+          <a:fillRef idx="1">
+            <a:schemeClr val="accent1"/>
+          </a:fillRef>
+          <a:effectRef idx="0">
+            <a:schemeClr val="accent1"/>
+          </a:effectRef>
+          <a:fontRef idx="minor">
+            <a:schemeClr val="lt1"/>
+          </a:fontRef>
+        </p:style>
+        <p:txBody>
+          <a:bodyPr rtlCol="0" anchor="ctr"/>
+          <a:lstStyle/>
+          <a:p>
+            <a:pPr algn="ctr"/>
+            <a:endParaRPr lang="ko-KR" altLang="en-US"/>
+          </a:p>
+        </p:txBody>
+      </p:sp>
+      <p:sp>
+        <p:nvSpPr>
+          <p:cNvPr id="5" name="모서리가 둥근 직사각형 4"/>
+          <p:cNvSpPr/>
+          <p:nvPr/>
+        </p:nvSpPr>
+        <p:spPr>
+          <a:xfrm>
+            <a:off x="5590309" y="1354975"/>
+            <a:ext cx="1188719" cy="540328"/>
+          </a:xfrm>
+          <a:prstGeom prst="roundRect">
+            <a:avLst/>
+          </a:prstGeom>
+          <a:solidFill>
+            <a:schemeClr val="bg1"/>
+          </a:solidFill>
+          <a:ln>
+            <a:solidFill>
+              <a:schemeClr val="tx1"/>
+            </a:solidFill>
+          </a:ln>
+        </p:spPr>
+        <p:style>
+          <a:lnRef idx="2">
+            <a:schemeClr val="accent1">
+              <a:shade val="50000"/>
+            </a:schemeClr>
+          </a:lnRef>
+          <a:fillRef idx="1">
+            <a:schemeClr val="accent1"/>
+          </a:fillRef>
+          <a:effectRef idx="0">
+            <a:schemeClr val="accent1"/>
+          </a:effectRef>
+          <a:fontRef idx="minor">
+            <a:schemeClr val="lt1"/>
+          </a:fontRef>
+        </p:style>
+        <p:txBody>
+          <a:bodyPr rtlCol="0" anchor="ctr"/>
+          <a:lstStyle/>
+          <a:p>
+            <a:pPr algn="ctr"/>
+            <a:endParaRPr lang="ko-KR" altLang="en-US"/>
+          </a:p>
+        </p:txBody>
+      </p:sp>
+      <p:sp>
+        <p:nvSpPr>
+          <p:cNvPr id="7" name="직사각형 6"/>
+          <p:cNvSpPr/>
+          <p:nvPr/>
+        </p:nvSpPr>
+        <p:spPr>
+          <a:xfrm>
+            <a:off x="6094668" y="1895303"/>
+            <a:ext cx="180000" cy="3832166"/>
+          </a:xfrm>
+          <a:prstGeom prst="rect">
+            <a:avLst/>
+          </a:prstGeom>
+          <a:solidFill>
+            <a:srgbClr val="FF0000"/>
+          </a:solidFill>
+          <a:ln>
+            <a:noFill/>
+          </a:ln>
+        </p:spPr>
+        <p:style>
+          <a:lnRef idx="2">
+            <a:schemeClr val="accent1">
+              <a:shade val="50000"/>
+            </a:schemeClr>
+          </a:lnRef>
+          <a:fillRef idx="1">
+            <a:schemeClr val="accent1"/>
+          </a:fillRef>
+          <a:effectRef idx="0">
+            <a:schemeClr val="accent1"/>
+          </a:effectRef>
+          <a:fontRef idx="minor">
+            <a:schemeClr val="lt1"/>
+          </a:fontRef>
+        </p:style>
+        <p:txBody>
+          <a:bodyPr rtlCol="0" anchor="ctr"/>
+          <a:lstStyle/>
+          <a:p>
+            <a:pPr algn="ctr"/>
+            <a:endParaRPr lang="ko-KR" altLang="en-US" dirty="0"/>
+          </a:p>
+        </p:txBody>
+      </p:sp>
+      <p:sp>
+        <p:nvSpPr>
+          <p:cNvPr id="8" name="직사각형 7"/>
+          <p:cNvSpPr/>
+          <p:nvPr/>
+        </p:nvSpPr>
+        <p:spPr>
+          <a:xfrm>
+            <a:off x="6094668" y="2589120"/>
+            <a:ext cx="180000" cy="3834000"/>
+          </a:xfrm>
+          <a:prstGeom prst="rect">
+            <a:avLst/>
+          </a:prstGeom>
+          <a:solidFill>
+            <a:srgbClr val="FFFF00"/>
+          </a:solidFill>
+          <a:ln>
+            <a:solidFill>
+              <a:srgbClr val="FFC000"/>
+            </a:solidFill>
+          </a:ln>
+        </p:spPr>
+        <p:style>
+          <a:lnRef idx="2">
+            <a:schemeClr val="accent1">
+              <a:shade val="50000"/>
+            </a:schemeClr>
+          </a:lnRef>
+          <a:fillRef idx="1">
+            <a:schemeClr val="accent1"/>
+          </a:fillRef>
+          <a:effectRef idx="0">
+            <a:schemeClr val="accent1"/>
+          </a:effectRef>
+          <a:fontRef idx="minor">
+            <a:schemeClr val="lt1"/>
+          </a:fontRef>
+        </p:style>
+        <p:txBody>
+          <a:bodyPr rtlCol="0" anchor="ctr"/>
+          <a:lstStyle/>
+          <a:p>
+            <a:pPr algn="ctr"/>
+            <a:endParaRPr lang="ko-KR" altLang="en-US"/>
+          </a:p>
+        </p:txBody>
+      </p:sp>
+      <p:grpSp>
+        <p:nvGrpSpPr>
+          <p:cNvPr id="9" name="그룹 8"/>
+          <p:cNvGrpSpPr/>
+          <p:nvPr/>
+        </p:nvGrpSpPr>
+        <p:grpSpPr>
+          <a:xfrm>
+            <a:off x="3940233" y="3100647"/>
+            <a:ext cx="465513" cy="465513"/>
+            <a:chOff x="5070764" y="2984269"/>
+            <a:chExt cx="2568632" cy="2568632"/>
+          </a:xfrm>
+        </p:grpSpPr>
+        <p:sp>
+          <p:nvSpPr>
+            <p:cNvPr id="10" name="타원 9"/>
+            <p:cNvSpPr/>
+            <p:nvPr/>
+          </p:nvSpPr>
+          <p:spPr>
+            <a:xfrm>
+              <a:off x="5070764" y="2984269"/>
+              <a:ext cx="2568632" cy="2568632"/>
+            </a:xfrm>
+            <a:prstGeom prst="ellipse">
+              <a:avLst/>
+            </a:prstGeom>
+            <a:solidFill>
+              <a:schemeClr val="bg1"/>
+            </a:solidFill>
+            <a:ln>
+              <a:solidFill>
+                <a:srgbClr val="FFFF00"/>
+              </a:solidFill>
+            </a:ln>
+          </p:spPr>
+          <p:style>
+            <a:lnRef idx="2">
+              <a:schemeClr val="accent1">
+                <a:shade val="50000"/>
+              </a:schemeClr>
+            </a:lnRef>
+            <a:fillRef idx="1">
+              <a:schemeClr val="accent1"/>
+            </a:fillRef>
+            <a:effectRef idx="0">
+              <a:schemeClr val="accent1"/>
+            </a:effectRef>
+            <a:fontRef idx="minor">
+              <a:schemeClr val="lt1"/>
+            </a:fontRef>
+          </p:style>
+          <p:txBody>
+            <a:bodyPr rtlCol="0" anchor="ctr"/>
+            <a:lstStyle/>
+            <a:p>
+              <a:pPr algn="ctr"/>
+              <a:endParaRPr lang="ko-KR" altLang="en-US"/>
+            </a:p>
+          </p:txBody>
+        </p:sp>
+        <p:sp>
+          <p:nvSpPr>
+            <p:cNvPr id="11" name="이등변 삼각형 10"/>
+            <p:cNvSpPr/>
+            <p:nvPr/>
+          </p:nvSpPr>
+          <p:spPr>
+            <a:xfrm>
+              <a:off x="6022405" y="3117272"/>
+              <a:ext cx="665350" cy="573578"/>
+            </a:xfrm>
+            <a:prstGeom prst="triangle">
+              <a:avLst/>
+            </a:prstGeom>
+            <a:solidFill>
+              <a:srgbClr val="FF0000"/>
+            </a:solidFill>
+            <a:ln>
+              <a:solidFill>
+                <a:srgbClr val="FFC000"/>
+              </a:solidFill>
+            </a:ln>
+          </p:spPr>
+          <p:style>
+            <a:lnRef idx="2">
+              <a:schemeClr val="accent1">
+                <a:shade val="50000"/>
+              </a:schemeClr>
+            </a:lnRef>
+            <a:fillRef idx="1">
+              <a:schemeClr val="accent1"/>
+            </a:fillRef>
+            <a:effectRef idx="0">
+              <a:schemeClr val="accent1"/>
+            </a:effectRef>
+            <a:fontRef idx="minor">
+              <a:schemeClr val="lt1"/>
+            </a:fontRef>
+          </p:style>
+          <p:txBody>
+            <a:bodyPr rtlCol="0" anchor="ctr"/>
+            <a:lstStyle/>
+            <a:p>
+              <a:pPr algn="ctr"/>
+              <a:endParaRPr lang="ko-KR" altLang="en-US"/>
+            </a:p>
+          </p:txBody>
+        </p:sp>
+      </p:grpSp>
+      <p:grpSp>
+        <p:nvGrpSpPr>
+          <p:cNvPr id="12" name="그룹 11"/>
+          <p:cNvGrpSpPr/>
+          <p:nvPr/>
+        </p:nvGrpSpPr>
+        <p:grpSpPr>
+          <a:xfrm>
+            <a:off x="8005157" y="3038301"/>
+            <a:ext cx="465513" cy="465513"/>
+            <a:chOff x="5070764" y="2984269"/>
+            <a:chExt cx="2568632" cy="2568632"/>
+          </a:xfrm>
+        </p:grpSpPr>
+        <p:sp>
+          <p:nvSpPr>
+            <p:cNvPr id="13" name="타원 12"/>
+            <p:cNvSpPr/>
+            <p:nvPr/>
+          </p:nvSpPr>
+          <p:spPr>
+            <a:xfrm>
+              <a:off x="5070764" y="2984269"/>
+              <a:ext cx="2568632" cy="2568632"/>
+            </a:xfrm>
+            <a:prstGeom prst="ellipse">
+              <a:avLst/>
+            </a:prstGeom>
+            <a:solidFill>
+              <a:schemeClr val="bg1"/>
+            </a:solidFill>
+            <a:ln>
+              <a:solidFill>
+                <a:srgbClr val="FFFF00"/>
+              </a:solidFill>
+            </a:ln>
+          </p:spPr>
+          <p:style>
+            <a:lnRef idx="2">
+              <a:schemeClr val="accent1">
+                <a:shade val="50000"/>
+              </a:schemeClr>
+            </a:lnRef>
+            <a:fillRef idx="1">
+              <a:schemeClr val="accent1"/>
+            </a:fillRef>
+            <a:effectRef idx="0">
+              <a:schemeClr val="accent1"/>
+            </a:effectRef>
+            <a:fontRef idx="minor">
+              <a:schemeClr val="lt1"/>
+            </a:fontRef>
+          </p:style>
+          <p:txBody>
+            <a:bodyPr rtlCol="0" anchor="ctr"/>
+            <a:lstStyle/>
+            <a:p>
+              <a:pPr algn="ctr"/>
+              <a:endParaRPr lang="ko-KR" altLang="en-US"/>
+            </a:p>
+          </p:txBody>
+        </p:sp>
+        <p:sp>
+          <p:nvSpPr>
+            <p:cNvPr id="14" name="이등변 삼각형 13"/>
+            <p:cNvSpPr/>
+            <p:nvPr/>
+          </p:nvSpPr>
+          <p:spPr>
+            <a:xfrm>
+              <a:off x="6022405" y="3117272"/>
+              <a:ext cx="665350" cy="573578"/>
+            </a:xfrm>
+            <a:prstGeom prst="triangle">
+              <a:avLst/>
+            </a:prstGeom>
+            <a:solidFill>
+              <a:srgbClr val="FF0000"/>
+            </a:solidFill>
+            <a:ln>
+              <a:solidFill>
+                <a:srgbClr val="FFC000"/>
+              </a:solidFill>
+            </a:ln>
+          </p:spPr>
+          <p:style>
+            <a:lnRef idx="2">
+              <a:schemeClr val="accent1">
+                <a:shade val="50000"/>
+              </a:schemeClr>
+            </a:lnRef>
+            <a:fillRef idx="1">
+              <a:schemeClr val="accent1"/>
+            </a:fillRef>
+            <a:effectRef idx="0">
+              <a:schemeClr val="accent1"/>
+            </a:effectRef>
+            <a:fontRef idx="minor">
+              <a:schemeClr val="lt1"/>
+            </a:fontRef>
+          </p:style>
+          <p:txBody>
+            <a:bodyPr rtlCol="0" anchor="ctr"/>
+            <a:lstStyle/>
+            <a:p>
+              <a:pPr algn="ctr"/>
+              <a:endParaRPr lang="ko-KR" altLang="en-US"/>
+            </a:p>
+          </p:txBody>
+        </p:sp>
+      </p:grpSp>
+      <p:sp>
+        <p:nvSpPr>
+          <p:cNvPr id="15" name="타원 14"/>
+          <p:cNvSpPr/>
+          <p:nvPr/>
+        </p:nvSpPr>
+        <p:spPr>
+          <a:xfrm>
+            <a:off x="5068174" y="2407086"/>
+            <a:ext cx="364067" cy="364067"/>
+          </a:xfrm>
+          <a:prstGeom prst="ellipse">
+            <a:avLst/>
+          </a:prstGeom>
+        </p:spPr>
+        <p:style>
+          <a:lnRef idx="2">
+            <a:schemeClr val="accent1">
+              <a:shade val="50000"/>
+            </a:schemeClr>
+          </a:lnRef>
+          <a:fillRef idx="1">
+            <a:schemeClr val="accent1"/>
+          </a:fillRef>
+          <a:effectRef idx="0">
+            <a:schemeClr val="accent1"/>
+          </a:effectRef>
+          <a:fontRef idx="minor">
+            <a:schemeClr val="lt1"/>
+          </a:fontRef>
+        </p:style>
+        <p:txBody>
+          <a:bodyPr rtlCol="0" anchor="ctr"/>
+          <a:lstStyle/>
+          <a:p>
+            <a:pPr algn="ctr"/>
+            <a:r>
+              <a:rPr lang="en-US" altLang="ko-KR" dirty="0" smtClean="0"/>
+              <a:t>1</a:t>
+            </a:r>
+            <a:endParaRPr lang="ko-KR" altLang="en-US" dirty="0"/>
+          </a:p>
+        </p:txBody>
+      </p:sp>
+      <p:sp>
+        <p:nvSpPr>
+          <p:cNvPr id="16" name="타원 15"/>
+          <p:cNvSpPr/>
+          <p:nvPr/>
+        </p:nvSpPr>
+        <p:spPr>
+          <a:xfrm>
+            <a:off x="6957879" y="2407085"/>
+            <a:ext cx="364067" cy="364067"/>
+          </a:xfrm>
+          <a:prstGeom prst="ellipse">
+            <a:avLst/>
+          </a:prstGeom>
+        </p:spPr>
+        <p:style>
+          <a:lnRef idx="2">
+            <a:schemeClr val="accent1">
+              <a:shade val="50000"/>
+            </a:schemeClr>
+          </a:lnRef>
+          <a:fillRef idx="1">
+            <a:schemeClr val="accent1"/>
+          </a:fillRef>
+          <a:effectRef idx="0">
+            <a:schemeClr val="accent1"/>
+          </a:effectRef>
+          <a:fontRef idx="minor">
+            <a:schemeClr val="lt1"/>
+          </a:fontRef>
+        </p:style>
+        <p:txBody>
+          <a:bodyPr rtlCol="0" anchor="ctr"/>
+          <a:lstStyle/>
+          <a:p>
+            <a:pPr algn="ctr"/>
+            <a:r>
+              <a:rPr lang="en-US" altLang="ko-KR" dirty="0" smtClean="0"/>
+              <a:t>+</a:t>
+            </a:r>
+            <a:endParaRPr lang="ko-KR" altLang="en-US" dirty="0"/>
+          </a:p>
+        </p:txBody>
+      </p:sp>
+      <p:sp>
+        <p:nvSpPr>
+          <p:cNvPr id="17" name="모서리가 둥근 직사각형 16"/>
+          <p:cNvSpPr/>
+          <p:nvPr/>
+        </p:nvSpPr>
+        <p:spPr>
+          <a:xfrm>
+            <a:off x="2750794" y="1465658"/>
+            <a:ext cx="1330036" cy="648393"/>
+          </a:xfrm>
+          <a:prstGeom prst="roundRect">
+            <a:avLst>
+              <a:gd name="adj" fmla="val 50000"/>
+            </a:avLst>
+          </a:prstGeom>
+          <a:solidFill>
+            <a:schemeClr val="accent4">
+              <a:lumMod val="40000"/>
+              <a:lumOff val="60000"/>
+            </a:schemeClr>
+          </a:solidFill>
+          <a:ln>
+            <a:solidFill>
+              <a:srgbClr val="FFFF00"/>
+            </a:solidFill>
+          </a:ln>
+        </p:spPr>
+        <p:style>
+          <a:lnRef idx="2">
+            <a:schemeClr val="accent1">
+              <a:shade val="50000"/>
+            </a:schemeClr>
+          </a:lnRef>
+          <a:fillRef idx="1">
+            <a:schemeClr val="accent1"/>
+          </a:fillRef>
+          <a:effectRef idx="0">
+            <a:schemeClr val="accent1"/>
+          </a:effectRef>
+          <a:fontRef idx="minor">
+            <a:schemeClr val="lt1"/>
+          </a:fontRef>
+        </p:style>
+        <p:txBody>
+          <a:bodyPr rtlCol="0" anchor="ctr"/>
+          <a:lstStyle/>
+          <a:p>
+            <a:pPr algn="ctr"/>
+            <a:endParaRPr lang="ko-KR" altLang="en-US"/>
+          </a:p>
+        </p:txBody>
+      </p:sp>
+      <p:sp>
+        <p:nvSpPr>
+          <p:cNvPr id="18" name="타원 17"/>
+          <p:cNvSpPr/>
+          <p:nvPr/>
+        </p:nvSpPr>
+        <p:spPr>
+          <a:xfrm>
+            <a:off x="3000895" y="3300153"/>
+            <a:ext cx="99752" cy="99752"/>
+          </a:xfrm>
+          <a:prstGeom prst="ellipse">
+            <a:avLst/>
+          </a:prstGeom>
+          <a:ln>
+            <a:noFill/>
+          </a:ln>
+        </p:spPr>
+        <p:style>
+          <a:lnRef idx="2">
+            <a:schemeClr val="accent1">
+              <a:shade val="50000"/>
+            </a:schemeClr>
+          </a:lnRef>
+          <a:fillRef idx="1">
+            <a:schemeClr val="accent1"/>
+          </a:fillRef>
+          <a:effectRef idx="0">
+            <a:schemeClr val="accent1"/>
+          </a:effectRef>
+          <a:fontRef idx="minor">
+            <a:schemeClr val="lt1"/>
+          </a:fontRef>
+        </p:style>
+        <p:txBody>
+          <a:bodyPr rtlCol="0" anchor="ctr"/>
+          <a:lstStyle/>
+          <a:p>
+            <a:pPr algn="ctr"/>
+            <a:endParaRPr lang="ko-KR" altLang="en-US"/>
+          </a:p>
+        </p:txBody>
+      </p:sp>
+      <p:sp>
+        <p:nvSpPr>
+          <p:cNvPr id="19" name="타원 18"/>
+          <p:cNvSpPr/>
+          <p:nvPr/>
+        </p:nvSpPr>
+        <p:spPr>
+          <a:xfrm>
+            <a:off x="3153295" y="3452553"/>
+            <a:ext cx="99752" cy="99752"/>
+          </a:xfrm>
+          <a:prstGeom prst="ellipse">
+            <a:avLst/>
+          </a:prstGeom>
+          <a:solidFill>
+            <a:srgbClr val="FF0000"/>
+          </a:solidFill>
+          <a:ln>
+            <a:noFill/>
+          </a:ln>
+        </p:spPr>
+        <p:style>
+          <a:lnRef idx="2">
+            <a:schemeClr val="accent1">
+              <a:shade val="50000"/>
+            </a:schemeClr>
+          </a:lnRef>
+          <a:fillRef idx="1">
+            <a:schemeClr val="accent1"/>
+          </a:fillRef>
+          <a:effectRef idx="0">
+            <a:schemeClr val="accent1"/>
+          </a:effectRef>
+          <a:fontRef idx="minor">
+            <a:schemeClr val="lt1"/>
+          </a:fontRef>
+        </p:style>
+        <p:txBody>
+          <a:bodyPr rtlCol="0" anchor="ctr"/>
+          <a:lstStyle/>
+          <a:p>
+            <a:pPr algn="ctr"/>
+            <a:endParaRPr lang="ko-KR" altLang="en-US"/>
+          </a:p>
+        </p:txBody>
+      </p:sp>
     </p:spTree>
     <p:extLst>
       <p:ext uri="{BB962C8B-B14F-4D97-AF65-F5344CB8AC3E}">

</xml_diff>

<commit_message>
Minimap, num > 10 Display
</commit_message>
<xml_diff>
--- a/Equation/Pictures.pptx
+++ b/Equation/Pictures.pptx
@@ -250,7 +250,7 @@
           <a:p>
             <a:fld id="{F00B919D-B4A1-482F-AA08-41F71413DB50}" type="datetimeFigureOut">
               <a:rPr lang="ko-KR" altLang="en-US" smtClean="0"/>
-              <a:t>2018-11-09</a:t>
+              <a:t>2018-11-10</a:t>
             </a:fld>
             <a:endParaRPr lang="ko-KR" altLang="en-US"/>
           </a:p>
@@ -420,7 +420,7 @@
           <a:p>
             <a:fld id="{F00B919D-B4A1-482F-AA08-41F71413DB50}" type="datetimeFigureOut">
               <a:rPr lang="ko-KR" altLang="en-US" smtClean="0"/>
-              <a:t>2018-11-09</a:t>
+              <a:t>2018-11-10</a:t>
             </a:fld>
             <a:endParaRPr lang="ko-KR" altLang="en-US"/>
           </a:p>
@@ -600,7 +600,7 @@
           <a:p>
             <a:fld id="{F00B919D-B4A1-482F-AA08-41F71413DB50}" type="datetimeFigureOut">
               <a:rPr lang="ko-KR" altLang="en-US" smtClean="0"/>
-              <a:t>2018-11-09</a:t>
+              <a:t>2018-11-10</a:t>
             </a:fld>
             <a:endParaRPr lang="ko-KR" altLang="en-US"/>
           </a:p>
@@ -770,7 +770,7 @@
           <a:p>
             <a:fld id="{F00B919D-B4A1-482F-AA08-41F71413DB50}" type="datetimeFigureOut">
               <a:rPr lang="ko-KR" altLang="en-US" smtClean="0"/>
-              <a:t>2018-11-09</a:t>
+              <a:t>2018-11-10</a:t>
             </a:fld>
             <a:endParaRPr lang="ko-KR" altLang="en-US"/>
           </a:p>
@@ -1016,7 +1016,7 @@
           <a:p>
             <a:fld id="{F00B919D-B4A1-482F-AA08-41F71413DB50}" type="datetimeFigureOut">
               <a:rPr lang="ko-KR" altLang="en-US" smtClean="0"/>
-              <a:t>2018-11-09</a:t>
+              <a:t>2018-11-10</a:t>
             </a:fld>
             <a:endParaRPr lang="ko-KR" altLang="en-US"/>
           </a:p>
@@ -1248,7 +1248,7 @@
           <a:p>
             <a:fld id="{F00B919D-B4A1-482F-AA08-41F71413DB50}" type="datetimeFigureOut">
               <a:rPr lang="ko-KR" altLang="en-US" smtClean="0"/>
-              <a:t>2018-11-09</a:t>
+              <a:t>2018-11-10</a:t>
             </a:fld>
             <a:endParaRPr lang="ko-KR" altLang="en-US"/>
           </a:p>
@@ -1615,7 +1615,7 @@
           <a:p>
             <a:fld id="{F00B919D-B4A1-482F-AA08-41F71413DB50}" type="datetimeFigureOut">
               <a:rPr lang="ko-KR" altLang="en-US" smtClean="0"/>
-              <a:t>2018-11-09</a:t>
+              <a:t>2018-11-10</a:t>
             </a:fld>
             <a:endParaRPr lang="ko-KR" altLang="en-US"/>
           </a:p>
@@ -1733,7 +1733,7 @@
           <a:p>
             <a:fld id="{F00B919D-B4A1-482F-AA08-41F71413DB50}" type="datetimeFigureOut">
               <a:rPr lang="ko-KR" altLang="en-US" smtClean="0"/>
-              <a:t>2018-11-09</a:t>
+              <a:t>2018-11-10</a:t>
             </a:fld>
             <a:endParaRPr lang="ko-KR" altLang="en-US"/>
           </a:p>
@@ -1828,7 +1828,7 @@
           <a:p>
             <a:fld id="{F00B919D-B4A1-482F-AA08-41F71413DB50}" type="datetimeFigureOut">
               <a:rPr lang="ko-KR" altLang="en-US" smtClean="0"/>
-              <a:t>2018-11-09</a:t>
+              <a:t>2018-11-10</a:t>
             </a:fld>
             <a:endParaRPr lang="ko-KR" altLang="en-US"/>
           </a:p>
@@ -2105,7 +2105,7 @@
           <a:p>
             <a:fld id="{F00B919D-B4A1-482F-AA08-41F71413DB50}" type="datetimeFigureOut">
               <a:rPr lang="ko-KR" altLang="en-US" smtClean="0"/>
-              <a:t>2018-11-09</a:t>
+              <a:t>2018-11-10</a:t>
             </a:fld>
             <a:endParaRPr lang="ko-KR" altLang="en-US"/>
           </a:p>
@@ -2358,7 +2358,7 @@
           <a:p>
             <a:fld id="{F00B919D-B4A1-482F-AA08-41F71413DB50}" type="datetimeFigureOut">
               <a:rPr lang="ko-KR" altLang="en-US" smtClean="0"/>
-              <a:t>2018-11-09</a:t>
+              <a:t>2018-11-10</a:t>
             </a:fld>
             <a:endParaRPr lang="ko-KR" altLang="en-US"/>
           </a:p>
@@ -2571,7 +2571,7 @@
           <a:p>
             <a:fld id="{F00B919D-B4A1-482F-AA08-41F71413DB50}" type="datetimeFigureOut">
               <a:rPr lang="ko-KR" altLang="en-US" smtClean="0"/>
-              <a:t>2018-11-09</a:t>
+              <a:t>2018-11-10</a:t>
             </a:fld>
             <a:endParaRPr lang="ko-KR" altLang="en-US"/>
           </a:p>
@@ -4844,6 +4844,36 @@
           </a:p>
         </p:txBody>
       </p:sp>
+      <p:sp>
+        <p:nvSpPr>
+          <p:cNvPr id="16" name="TextBox 15"/>
+          <p:cNvSpPr txBox="1"/>
+          <p:nvPr/>
+        </p:nvSpPr>
+        <p:spPr>
+          <a:xfrm>
+            <a:off x="6037631" y="2634211"/>
+            <a:ext cx="1106393" cy="1631216"/>
+          </a:xfrm>
+          <a:prstGeom prst="rect">
+            <a:avLst/>
+          </a:prstGeom>
+          <a:noFill/>
+        </p:spPr>
+        <p:txBody>
+          <a:bodyPr wrap="none" rtlCol="0">
+            <a:spAutoFit/>
+          </a:bodyPr>
+          <a:lstStyle/>
+          <a:p>
+            <a:r>
+              <a:rPr lang="en-US" altLang="ko-KR" sz="10000" b="1" dirty="0" smtClean="0"/>
+              <a:t>÷</a:t>
+            </a:r>
+            <a:endParaRPr lang="ko-KR" altLang="en-US" sz="10000" b="1" dirty="0"/>
+          </a:p>
+        </p:txBody>
+      </p:sp>
     </p:spTree>
     <p:extLst>
       <p:ext uri="{BB962C8B-B14F-4D97-AF65-F5344CB8AC3E}">
@@ -5901,7 +5931,7 @@
           </a:xfrm>
           <a:prstGeom prst="roundRect">
             <a:avLst>
-              <a:gd name="adj" fmla="val 50000"/>
+              <a:gd name="adj" fmla="val 0"/>
             </a:avLst>
           </a:prstGeom>
           <a:solidFill>
@@ -6030,6 +6060,264 @@
           </a:p>
         </p:txBody>
       </p:sp>
+      <p:sp>
+        <p:nvSpPr>
+          <p:cNvPr id="3" name="직사각형 2"/>
+          <p:cNvSpPr/>
+          <p:nvPr/>
+        </p:nvSpPr>
+        <p:spPr>
+          <a:xfrm>
+            <a:off x="5656810" y="4671753"/>
+            <a:ext cx="1055716" cy="1055716"/>
+          </a:xfrm>
+          <a:prstGeom prst="rect">
+            <a:avLst/>
+          </a:prstGeom>
+          <a:solidFill>
+            <a:schemeClr val="tx1"/>
+          </a:solidFill>
+          <a:ln>
+            <a:solidFill>
+              <a:schemeClr val="bg1"/>
+            </a:solidFill>
+          </a:ln>
+        </p:spPr>
+        <p:style>
+          <a:lnRef idx="2">
+            <a:schemeClr val="accent1">
+              <a:shade val="50000"/>
+            </a:schemeClr>
+          </a:lnRef>
+          <a:fillRef idx="1">
+            <a:schemeClr val="accent1"/>
+          </a:fillRef>
+          <a:effectRef idx="0">
+            <a:schemeClr val="accent1"/>
+          </a:effectRef>
+          <a:fontRef idx="minor">
+            <a:schemeClr val="lt1"/>
+          </a:fontRef>
+        </p:style>
+        <p:txBody>
+          <a:bodyPr rtlCol="0" anchor="ctr"/>
+          <a:lstStyle/>
+          <a:p>
+            <a:pPr algn="ctr"/>
+            <a:endParaRPr lang="ko-KR" altLang="en-US"/>
+          </a:p>
+        </p:txBody>
+      </p:sp>
+      <p:sp>
+        <p:nvSpPr>
+          <p:cNvPr id="6" name="직사각형 5"/>
+          <p:cNvSpPr/>
+          <p:nvPr/>
+        </p:nvSpPr>
+        <p:spPr>
+          <a:xfrm>
+            <a:off x="7681448" y="4143453"/>
+            <a:ext cx="1440000" cy="1800000"/>
+          </a:xfrm>
+          <a:prstGeom prst="rect">
+            <a:avLst/>
+          </a:prstGeom>
+          <a:solidFill>
+            <a:schemeClr val="tx1">
+              <a:lumMod val="50000"/>
+              <a:lumOff val="50000"/>
+            </a:schemeClr>
+          </a:solidFill>
+          <a:ln w="76200">
+            <a:solidFill>
+              <a:schemeClr val="bg1"/>
+            </a:solidFill>
+          </a:ln>
+        </p:spPr>
+        <p:style>
+          <a:lnRef idx="2">
+            <a:schemeClr val="accent1">
+              <a:shade val="50000"/>
+            </a:schemeClr>
+          </a:lnRef>
+          <a:fillRef idx="1">
+            <a:schemeClr val="accent1"/>
+          </a:fillRef>
+          <a:effectRef idx="0">
+            <a:schemeClr val="accent1"/>
+          </a:effectRef>
+          <a:fontRef idx="minor">
+            <a:schemeClr val="lt1"/>
+          </a:fontRef>
+        </p:style>
+        <p:txBody>
+          <a:bodyPr rtlCol="0" anchor="ctr"/>
+          <a:lstStyle/>
+          <a:p>
+            <a:pPr algn="ctr"/>
+            <a:endParaRPr lang="ko-KR" altLang="en-US"/>
+          </a:p>
+        </p:txBody>
+      </p:sp>
+      <p:sp>
+        <p:nvSpPr>
+          <p:cNvPr id="21" name="직사각형 20"/>
+          <p:cNvSpPr/>
+          <p:nvPr/>
+        </p:nvSpPr>
+        <p:spPr>
+          <a:xfrm>
+            <a:off x="4405746" y="4429957"/>
+            <a:ext cx="720000" cy="360000"/>
+          </a:xfrm>
+          <a:prstGeom prst="rect">
+            <a:avLst/>
+          </a:prstGeom>
+          <a:solidFill>
+            <a:srgbClr val="FFE699"/>
+          </a:solidFill>
+          <a:ln>
+            <a:solidFill>
+              <a:srgbClr val="FFFF00"/>
+            </a:solidFill>
+          </a:ln>
+        </p:spPr>
+        <p:style>
+          <a:lnRef idx="2">
+            <a:schemeClr val="accent1">
+              <a:shade val="50000"/>
+            </a:schemeClr>
+          </a:lnRef>
+          <a:fillRef idx="1">
+            <a:schemeClr val="accent1"/>
+          </a:fillRef>
+          <a:effectRef idx="0">
+            <a:schemeClr val="accent1"/>
+          </a:effectRef>
+          <a:fontRef idx="minor">
+            <a:schemeClr val="lt1"/>
+          </a:fontRef>
+        </p:style>
+        <p:txBody>
+          <a:bodyPr rtlCol="0" anchor="ctr"/>
+          <a:lstStyle/>
+          <a:p>
+            <a:pPr algn="ctr"/>
+            <a:endParaRPr lang="ko-KR" altLang="en-US"/>
+          </a:p>
+        </p:txBody>
+      </p:sp>
+      <p:grpSp>
+        <p:nvGrpSpPr>
+          <p:cNvPr id="22" name="그룹 21"/>
+          <p:cNvGrpSpPr/>
+          <p:nvPr/>
+        </p:nvGrpSpPr>
+        <p:grpSpPr>
+          <a:xfrm>
+            <a:off x="5017450" y="3259688"/>
+            <a:ext cx="465513" cy="465513"/>
+            <a:chOff x="5070764" y="2984269"/>
+            <a:chExt cx="2568632" cy="2568632"/>
+          </a:xfrm>
+        </p:grpSpPr>
+        <p:sp>
+          <p:nvSpPr>
+            <p:cNvPr id="23" name="타원 22"/>
+            <p:cNvSpPr/>
+            <p:nvPr/>
+          </p:nvSpPr>
+          <p:spPr>
+            <a:xfrm>
+              <a:off x="5070764" y="2984269"/>
+              <a:ext cx="2568632" cy="2568632"/>
+            </a:xfrm>
+            <a:prstGeom prst="ellipse">
+              <a:avLst/>
+            </a:prstGeom>
+            <a:solidFill>
+              <a:schemeClr val="bg1"/>
+            </a:solidFill>
+            <a:ln>
+              <a:solidFill>
+                <a:srgbClr val="FFFF00"/>
+              </a:solidFill>
+            </a:ln>
+          </p:spPr>
+          <p:style>
+            <a:lnRef idx="2">
+              <a:schemeClr val="accent1">
+                <a:shade val="50000"/>
+              </a:schemeClr>
+            </a:lnRef>
+            <a:fillRef idx="1">
+              <a:schemeClr val="accent1"/>
+            </a:fillRef>
+            <a:effectRef idx="0">
+              <a:schemeClr val="accent1"/>
+            </a:effectRef>
+            <a:fontRef idx="minor">
+              <a:schemeClr val="lt1"/>
+            </a:fontRef>
+          </p:style>
+          <p:txBody>
+            <a:bodyPr rtlCol="0" anchor="ctr"/>
+            <a:lstStyle/>
+            <a:p>
+              <a:pPr algn="ctr"/>
+              <a:endParaRPr lang="ko-KR" altLang="en-US"/>
+            </a:p>
+          </p:txBody>
+        </p:sp>
+        <p:sp>
+          <p:nvSpPr>
+            <p:cNvPr id="24" name="이등변 삼각형 23"/>
+            <p:cNvSpPr/>
+            <p:nvPr/>
+          </p:nvSpPr>
+          <p:spPr>
+            <a:xfrm>
+              <a:off x="6022405" y="3117272"/>
+              <a:ext cx="665350" cy="573578"/>
+            </a:xfrm>
+            <a:prstGeom prst="triangle">
+              <a:avLst/>
+            </a:prstGeom>
+            <a:solidFill>
+              <a:srgbClr val="FF0000"/>
+            </a:solidFill>
+            <a:ln>
+              <a:solidFill>
+                <a:srgbClr val="FFC000"/>
+              </a:solidFill>
+            </a:ln>
+          </p:spPr>
+          <p:style>
+            <a:lnRef idx="2">
+              <a:schemeClr val="accent1">
+                <a:shade val="50000"/>
+              </a:schemeClr>
+            </a:lnRef>
+            <a:fillRef idx="1">
+              <a:schemeClr val="accent1"/>
+            </a:fillRef>
+            <a:effectRef idx="0">
+              <a:schemeClr val="accent1"/>
+            </a:effectRef>
+            <a:fontRef idx="minor">
+              <a:schemeClr val="lt1"/>
+            </a:fontRef>
+          </p:style>
+          <p:txBody>
+            <a:bodyPr rtlCol="0" anchor="ctr"/>
+            <a:lstStyle/>
+            <a:p>
+              <a:pPr algn="ctr"/>
+              <a:endParaRPr lang="ko-KR" altLang="en-US"/>
+            </a:p>
+          </p:txBody>
+        </p:sp>
+      </p:grpSp>
     </p:spTree>
     <p:extLst>
       <p:ext uri="{BB962C8B-B14F-4D97-AF65-F5344CB8AC3E}">

</xml_diff>